<commit_message>
added PPT to the presention
</commit_message>
<xml_diff>
--- a/MSc CGE – MathsGfx1 – Coursework2.pptx
+++ b/MSc CGE – MathsGfx1 – Coursework2.pptx
@@ -4,6 +4,9 @@
   <p:sldMasterIdLst>
     <p:sldMasterId id="2147483672" r:id="rId1"/>
   </p:sldMasterIdLst>
+  <p:notesMasterIdLst>
+    <p:notesMasterId r:id="rId12"/>
+  </p:notesMasterIdLst>
   <p:sldIdLst>
     <p:sldId id="256" r:id="rId2"/>
     <p:sldId id="257" r:id="rId3"/>
@@ -114,6 +117,456 @@
     </a:lvl9pPr>
   </p:defaultTextStyle>
 </p:presentation>
+</file>
+
+<file path=ppt/notesMasters/notesMaster1.xml><?xml version="1.0" encoding="utf-8"?>
+<p:notesMaster xmlns:a="http://schemas.openxmlformats.org/drawingml/2006/main" xmlns:r="http://schemas.openxmlformats.org/officeDocument/2006/relationships" xmlns:p="http://schemas.openxmlformats.org/presentationml/2006/main">
+  <p:cSld>
+    <p:bg>
+      <p:bgRef idx="1001">
+        <a:schemeClr val="bg1"/>
+      </p:bgRef>
+    </p:bg>
+    <p:spTree>
+      <p:nvGrpSpPr>
+        <p:cNvPr id="1" name=""/>
+        <p:cNvGrpSpPr/>
+        <p:nvPr/>
+      </p:nvGrpSpPr>
+      <p:grpSpPr>
+        <a:xfrm>
+          <a:off x="0" y="0"/>
+          <a:ext cx="0" cy="0"/>
+          <a:chOff x="0" y="0"/>
+          <a:chExt cx="0" cy="0"/>
+        </a:xfrm>
+      </p:grpSpPr>
+      <p:sp>
+        <p:nvSpPr>
+          <p:cNvPr id="2" name="Верхний колонтитул 1"/>
+          <p:cNvSpPr>
+            <a:spLocks noGrp="1"/>
+          </p:cNvSpPr>
+          <p:nvPr>
+            <p:ph type="hdr" sz="quarter"/>
+          </p:nvPr>
+        </p:nvSpPr>
+        <p:spPr>
+          <a:xfrm>
+            <a:off x="0" y="0"/>
+            <a:ext cx="2971800" cy="457200"/>
+          </a:xfrm>
+          <a:prstGeom prst="rect">
+            <a:avLst/>
+          </a:prstGeom>
+        </p:spPr>
+        <p:txBody>
+          <a:bodyPr vert="horz" lIns="91440" tIns="45720" rIns="91440" bIns="45720" rtlCol="0"/>
+          <a:lstStyle>
+            <a:lvl1pPr algn="l">
+              <a:defRPr sz="1200"/>
+            </a:lvl1pPr>
+          </a:lstStyle>
+          <a:p>
+            <a:endParaRPr lang="en-GB"/>
+          </a:p>
+        </p:txBody>
+      </p:sp>
+      <p:sp>
+        <p:nvSpPr>
+          <p:cNvPr id="3" name="Дата 2"/>
+          <p:cNvSpPr>
+            <a:spLocks noGrp="1"/>
+          </p:cNvSpPr>
+          <p:nvPr>
+            <p:ph type="dt" idx="1"/>
+          </p:nvPr>
+        </p:nvSpPr>
+        <p:spPr>
+          <a:xfrm>
+            <a:off x="3884613" y="0"/>
+            <a:ext cx="2971800" cy="457200"/>
+          </a:xfrm>
+          <a:prstGeom prst="rect">
+            <a:avLst/>
+          </a:prstGeom>
+        </p:spPr>
+        <p:txBody>
+          <a:bodyPr vert="horz" lIns="91440" tIns="45720" rIns="91440" bIns="45720" rtlCol="0"/>
+          <a:lstStyle>
+            <a:lvl1pPr algn="r">
+              <a:defRPr sz="1200"/>
+            </a:lvl1pPr>
+          </a:lstStyle>
+          <a:p>
+            <a:fld id="{1DD0DCD2-5F88-4A53-BE69-68D7D316DFA9}" type="datetimeFigureOut">
+              <a:rPr lang="en-GB" smtClean="0"/>
+              <a:t>11/02/2014</a:t>
+            </a:fld>
+            <a:endParaRPr lang="en-GB"/>
+          </a:p>
+        </p:txBody>
+      </p:sp>
+      <p:sp>
+        <p:nvSpPr>
+          <p:cNvPr id="4" name="Образ слайда 3"/>
+          <p:cNvSpPr>
+            <a:spLocks noGrp="1" noRot="1" noChangeAspect="1"/>
+          </p:cNvSpPr>
+          <p:nvPr>
+            <p:ph type="sldImg" idx="2"/>
+          </p:nvPr>
+        </p:nvSpPr>
+        <p:spPr>
+          <a:xfrm>
+            <a:off x="1143000" y="685800"/>
+            <a:ext cx="4572000" cy="3429000"/>
+          </a:xfrm>
+          <a:prstGeom prst="rect">
+            <a:avLst/>
+          </a:prstGeom>
+          <a:noFill/>
+          <a:ln w="12700">
+            <a:solidFill>
+              <a:prstClr val="black"/>
+            </a:solidFill>
+          </a:ln>
+        </p:spPr>
+        <p:txBody>
+          <a:bodyPr vert="horz" lIns="91440" tIns="45720" rIns="91440" bIns="45720" rtlCol="0" anchor="ctr"/>
+          <a:lstStyle/>
+          <a:p>
+            <a:endParaRPr lang="en-GB"/>
+          </a:p>
+        </p:txBody>
+      </p:sp>
+      <p:sp>
+        <p:nvSpPr>
+          <p:cNvPr id="5" name="Заметки 4"/>
+          <p:cNvSpPr>
+            <a:spLocks noGrp="1"/>
+          </p:cNvSpPr>
+          <p:nvPr>
+            <p:ph type="body" sz="quarter" idx="3"/>
+          </p:nvPr>
+        </p:nvSpPr>
+        <p:spPr>
+          <a:xfrm>
+            <a:off x="685800" y="4343400"/>
+            <a:ext cx="5486400" cy="4114800"/>
+          </a:xfrm>
+          <a:prstGeom prst="rect">
+            <a:avLst/>
+          </a:prstGeom>
+        </p:spPr>
+        <p:txBody>
+          <a:bodyPr vert="horz" lIns="91440" tIns="45720" rIns="91440" bIns="45720" rtlCol="0"/>
+          <a:lstStyle/>
+          <a:p>
+            <a:pPr lvl="0"/>
+            <a:r>
+              <a:rPr lang="ru-RU" smtClean="0"/>
+              <a:t>Образец текста</a:t>
+            </a:r>
+          </a:p>
+          <a:p>
+            <a:pPr lvl="1"/>
+            <a:r>
+              <a:rPr lang="ru-RU" smtClean="0"/>
+              <a:t>Второй уровень</a:t>
+            </a:r>
+          </a:p>
+          <a:p>
+            <a:pPr lvl="2"/>
+            <a:r>
+              <a:rPr lang="ru-RU" smtClean="0"/>
+              <a:t>Третий уровень</a:t>
+            </a:r>
+          </a:p>
+          <a:p>
+            <a:pPr lvl="3"/>
+            <a:r>
+              <a:rPr lang="ru-RU" smtClean="0"/>
+              <a:t>Четвертый уровень</a:t>
+            </a:r>
+          </a:p>
+          <a:p>
+            <a:pPr lvl="4"/>
+            <a:r>
+              <a:rPr lang="ru-RU" smtClean="0"/>
+              <a:t>Пятый уровень</a:t>
+            </a:r>
+            <a:endParaRPr lang="en-GB"/>
+          </a:p>
+        </p:txBody>
+      </p:sp>
+      <p:sp>
+        <p:nvSpPr>
+          <p:cNvPr id="6" name="Нижний колонтитул 5"/>
+          <p:cNvSpPr>
+            <a:spLocks noGrp="1"/>
+          </p:cNvSpPr>
+          <p:nvPr>
+            <p:ph type="ftr" sz="quarter" idx="4"/>
+          </p:nvPr>
+        </p:nvSpPr>
+        <p:spPr>
+          <a:xfrm>
+            <a:off x="0" y="8685213"/>
+            <a:ext cx="2971800" cy="457200"/>
+          </a:xfrm>
+          <a:prstGeom prst="rect">
+            <a:avLst/>
+          </a:prstGeom>
+        </p:spPr>
+        <p:txBody>
+          <a:bodyPr vert="horz" lIns="91440" tIns="45720" rIns="91440" bIns="45720" rtlCol="0" anchor="b"/>
+          <a:lstStyle>
+            <a:lvl1pPr algn="l">
+              <a:defRPr sz="1200"/>
+            </a:lvl1pPr>
+          </a:lstStyle>
+          <a:p>
+            <a:endParaRPr lang="en-GB"/>
+          </a:p>
+        </p:txBody>
+      </p:sp>
+      <p:sp>
+        <p:nvSpPr>
+          <p:cNvPr id="7" name="Номер слайда 6"/>
+          <p:cNvSpPr>
+            <a:spLocks noGrp="1"/>
+          </p:cNvSpPr>
+          <p:nvPr>
+            <p:ph type="sldNum" sz="quarter" idx="5"/>
+          </p:nvPr>
+        </p:nvSpPr>
+        <p:spPr>
+          <a:xfrm>
+            <a:off x="3884613" y="8685213"/>
+            <a:ext cx="2971800" cy="457200"/>
+          </a:xfrm>
+          <a:prstGeom prst="rect">
+            <a:avLst/>
+          </a:prstGeom>
+        </p:spPr>
+        <p:txBody>
+          <a:bodyPr vert="horz" lIns="91440" tIns="45720" rIns="91440" bIns="45720" rtlCol="0" anchor="b"/>
+          <a:lstStyle>
+            <a:lvl1pPr algn="r">
+              <a:defRPr sz="1200"/>
+            </a:lvl1pPr>
+          </a:lstStyle>
+          <a:p>
+            <a:fld id="{A7BD8B91-3C05-4341-8C4F-D4CAF6B0732C}" type="slidenum">
+              <a:rPr lang="en-GB" smtClean="0"/>
+              <a:t>‹#›</a:t>
+            </a:fld>
+            <a:endParaRPr lang="en-GB"/>
+          </a:p>
+        </p:txBody>
+      </p:sp>
+    </p:spTree>
+    <p:extLst>
+      <p:ext uri="{BB962C8B-B14F-4D97-AF65-F5344CB8AC3E}">
+        <p14:creationId xmlns:p14="http://schemas.microsoft.com/office/powerpoint/2010/main" val="2213547731"/>
+      </p:ext>
+    </p:extLst>
+  </p:cSld>
+  <p:clrMap bg1="lt1" tx1="dk1" bg2="lt2" tx2="dk2" accent1="accent1" accent2="accent2" accent3="accent3" accent4="accent4" accent5="accent5" accent6="accent6" hlink="hlink" folHlink="folHlink"/>
+  <p:notesStyle>
+    <a:lvl1pPr marL="0" algn="l" defTabSz="914400" rtl="0" eaLnBrk="1" latinLnBrk="0" hangingPunct="1">
+      <a:defRPr sz="1200" kern="1200">
+        <a:solidFill>
+          <a:schemeClr val="tx1"/>
+        </a:solidFill>
+        <a:latin typeface="+mn-lt"/>
+        <a:ea typeface="+mn-ea"/>
+        <a:cs typeface="+mn-cs"/>
+      </a:defRPr>
+    </a:lvl1pPr>
+    <a:lvl2pPr marL="457200" algn="l" defTabSz="914400" rtl="0" eaLnBrk="1" latinLnBrk="0" hangingPunct="1">
+      <a:defRPr sz="1200" kern="1200">
+        <a:solidFill>
+          <a:schemeClr val="tx1"/>
+        </a:solidFill>
+        <a:latin typeface="+mn-lt"/>
+        <a:ea typeface="+mn-ea"/>
+        <a:cs typeface="+mn-cs"/>
+      </a:defRPr>
+    </a:lvl2pPr>
+    <a:lvl3pPr marL="914400" algn="l" defTabSz="914400" rtl="0" eaLnBrk="1" latinLnBrk="0" hangingPunct="1">
+      <a:defRPr sz="1200" kern="1200">
+        <a:solidFill>
+          <a:schemeClr val="tx1"/>
+        </a:solidFill>
+        <a:latin typeface="+mn-lt"/>
+        <a:ea typeface="+mn-ea"/>
+        <a:cs typeface="+mn-cs"/>
+      </a:defRPr>
+    </a:lvl3pPr>
+    <a:lvl4pPr marL="1371600" algn="l" defTabSz="914400" rtl="0" eaLnBrk="1" latinLnBrk="0" hangingPunct="1">
+      <a:defRPr sz="1200" kern="1200">
+        <a:solidFill>
+          <a:schemeClr val="tx1"/>
+        </a:solidFill>
+        <a:latin typeface="+mn-lt"/>
+        <a:ea typeface="+mn-ea"/>
+        <a:cs typeface="+mn-cs"/>
+      </a:defRPr>
+    </a:lvl4pPr>
+    <a:lvl5pPr marL="1828800" algn="l" defTabSz="914400" rtl="0" eaLnBrk="1" latinLnBrk="0" hangingPunct="1">
+      <a:defRPr sz="1200" kern="1200">
+        <a:solidFill>
+          <a:schemeClr val="tx1"/>
+        </a:solidFill>
+        <a:latin typeface="+mn-lt"/>
+        <a:ea typeface="+mn-ea"/>
+        <a:cs typeface="+mn-cs"/>
+      </a:defRPr>
+    </a:lvl5pPr>
+    <a:lvl6pPr marL="2286000" algn="l" defTabSz="914400" rtl="0" eaLnBrk="1" latinLnBrk="0" hangingPunct="1">
+      <a:defRPr sz="1200" kern="1200">
+        <a:solidFill>
+          <a:schemeClr val="tx1"/>
+        </a:solidFill>
+        <a:latin typeface="+mn-lt"/>
+        <a:ea typeface="+mn-ea"/>
+        <a:cs typeface="+mn-cs"/>
+      </a:defRPr>
+    </a:lvl6pPr>
+    <a:lvl7pPr marL="2743200" algn="l" defTabSz="914400" rtl="0" eaLnBrk="1" latinLnBrk="0" hangingPunct="1">
+      <a:defRPr sz="1200" kern="1200">
+        <a:solidFill>
+          <a:schemeClr val="tx1"/>
+        </a:solidFill>
+        <a:latin typeface="+mn-lt"/>
+        <a:ea typeface="+mn-ea"/>
+        <a:cs typeface="+mn-cs"/>
+      </a:defRPr>
+    </a:lvl7pPr>
+    <a:lvl8pPr marL="3200400" algn="l" defTabSz="914400" rtl="0" eaLnBrk="1" latinLnBrk="0" hangingPunct="1">
+      <a:defRPr sz="1200" kern="1200">
+        <a:solidFill>
+          <a:schemeClr val="tx1"/>
+        </a:solidFill>
+        <a:latin typeface="+mn-lt"/>
+        <a:ea typeface="+mn-ea"/>
+        <a:cs typeface="+mn-cs"/>
+      </a:defRPr>
+    </a:lvl8pPr>
+    <a:lvl9pPr marL="3657600" algn="l" defTabSz="914400" rtl="0" eaLnBrk="1" latinLnBrk="0" hangingPunct="1">
+      <a:defRPr sz="1200" kern="1200">
+        <a:solidFill>
+          <a:schemeClr val="tx1"/>
+        </a:solidFill>
+        <a:latin typeface="+mn-lt"/>
+        <a:ea typeface="+mn-ea"/>
+        <a:cs typeface="+mn-cs"/>
+      </a:defRPr>
+    </a:lvl9pPr>
+  </p:notesStyle>
+</p:notesMaster>
+</file>
+
+<file path=ppt/notesSlides/notesSlide1.xml><?xml version="1.0" encoding="utf-8"?>
+<p:notes xmlns:a="http://schemas.openxmlformats.org/drawingml/2006/main" xmlns:r="http://schemas.openxmlformats.org/officeDocument/2006/relationships" xmlns:p="http://schemas.openxmlformats.org/presentationml/2006/main">
+  <p:cSld>
+    <p:spTree>
+      <p:nvGrpSpPr>
+        <p:cNvPr id="1" name=""/>
+        <p:cNvGrpSpPr/>
+        <p:nvPr/>
+      </p:nvGrpSpPr>
+      <p:grpSpPr>
+        <a:xfrm>
+          <a:off x="0" y="0"/>
+          <a:ext cx="0" cy="0"/>
+          <a:chOff x="0" y="0"/>
+          <a:chExt cx="0" cy="0"/>
+        </a:xfrm>
+      </p:grpSpPr>
+      <p:sp>
+        <p:nvSpPr>
+          <p:cNvPr id="2" name="Образ слайда 1"/>
+          <p:cNvSpPr>
+            <a:spLocks noGrp="1" noRot="1" noChangeAspect="1"/>
+          </p:cNvSpPr>
+          <p:nvPr>
+            <p:ph type="sldImg"/>
+          </p:nvPr>
+        </p:nvSpPr>
+        <p:spPr/>
+      </p:sp>
+      <p:sp>
+        <p:nvSpPr>
+          <p:cNvPr id="3" name="Заметки 2"/>
+          <p:cNvSpPr>
+            <a:spLocks noGrp="1"/>
+          </p:cNvSpPr>
+          <p:nvPr>
+            <p:ph type="body" idx="1"/>
+          </p:nvPr>
+        </p:nvSpPr>
+        <p:spPr/>
+        <p:txBody>
+          <a:bodyPr/>
+          <a:lstStyle/>
+          <a:p>
+            <a:r>
+              <a:rPr lang="en-GB" dirty="0" smtClean="0"/>
+              <a:t>In order to</a:t>
+            </a:r>
+            <a:r>
+              <a:rPr lang="en-GB" baseline="0" dirty="0" smtClean="0"/>
+              <a:t> build balcony in the correct direction, we need to find the outside direction of the building. For this we first find the cross product of the first and last wall, then we find the norm of the wall, then we need to find the cross product of the norm of the wall and one of its side. Then we compare the first cross product with </a:t>
+            </a:r>
+            <a:r>
+              <a:rPr lang="en-GB" baseline="0" smtClean="0"/>
+              <a:t>this last </a:t>
+            </a:r>
+            <a:r>
+              <a:rPr lang="en-GB" baseline="0" dirty="0" smtClean="0"/>
+              <a:t>cross product.</a:t>
+            </a:r>
+            <a:endParaRPr lang="en-GB" dirty="0"/>
+          </a:p>
+        </p:txBody>
+      </p:sp>
+      <p:sp>
+        <p:nvSpPr>
+          <p:cNvPr id="4" name="Номер слайда 3"/>
+          <p:cNvSpPr>
+            <a:spLocks noGrp="1"/>
+          </p:cNvSpPr>
+          <p:nvPr>
+            <p:ph type="sldNum" sz="quarter" idx="10"/>
+          </p:nvPr>
+        </p:nvSpPr>
+        <p:spPr/>
+        <p:txBody>
+          <a:bodyPr/>
+          <a:lstStyle/>
+          <a:p>
+            <a:fld id="{A7BD8B91-3C05-4341-8C4F-D4CAF6B0732C}" type="slidenum">
+              <a:rPr lang="en-GB" smtClean="0"/>
+              <a:t>8</a:t>
+            </a:fld>
+            <a:endParaRPr lang="en-GB"/>
+          </a:p>
+        </p:txBody>
+      </p:sp>
+    </p:spTree>
+    <p:extLst>
+      <p:ext uri="{BB962C8B-B14F-4D97-AF65-F5344CB8AC3E}">
+        <p14:creationId xmlns:p14="http://schemas.microsoft.com/office/powerpoint/2010/main" val="2883259109"/>
+      </p:ext>
+    </p:extLst>
+  </p:cSld>
+  <p:clrMapOvr>
+    <a:masterClrMapping/>
+  </p:clrMapOvr>
+</p:notes>
 </file>
 
 <file path=ppt/slideLayouts/slideLayout1.xml><?xml version="1.0" encoding="utf-8"?>
@@ -1928,7 +2381,7 @@
           <a:p>
             <a:fld id="{1F8D5B3F-2953-462A-863C-57A86A073E3F}" type="datetimeFigureOut">
               <a:rPr lang="en-GB" smtClean="0"/>
-              <a:t>03/02/2014</a:t>
+              <a:t>11/02/2014</a:t>
             </a:fld>
             <a:endParaRPr lang="en-GB"/>
           </a:p>
@@ -2109,7 +2562,7 @@
           <a:p>
             <a:fld id="{1F8D5B3F-2953-462A-863C-57A86A073E3F}" type="datetimeFigureOut">
               <a:rPr lang="en-GB" smtClean="0"/>
-              <a:t>03/02/2014</a:t>
+              <a:t>11/02/2014</a:t>
             </a:fld>
             <a:endParaRPr lang="en-GB"/>
           </a:p>
@@ -2260,7 +2713,7 @@
           <a:p>
             <a:fld id="{1F8D5B3F-2953-462A-863C-57A86A073E3F}" type="datetimeFigureOut">
               <a:rPr lang="en-GB" smtClean="0"/>
-              <a:t>03/02/2014</a:t>
+              <a:t>11/02/2014</a:t>
             </a:fld>
             <a:endParaRPr lang="en-GB"/>
           </a:p>
@@ -4086,7 +4539,7 @@
           <a:p>
             <a:fld id="{1F8D5B3F-2953-462A-863C-57A86A073E3F}" type="datetimeFigureOut">
               <a:rPr lang="en-GB" smtClean="0"/>
-              <a:t>03/02/2014</a:t>
+              <a:t>11/02/2014</a:t>
             </a:fld>
             <a:endParaRPr lang="en-GB"/>
           </a:p>
@@ -5956,7 +6409,7 @@
           <a:p>
             <a:fld id="{1F8D5B3F-2953-462A-863C-57A86A073E3F}" type="datetimeFigureOut">
               <a:rPr lang="en-GB" smtClean="0"/>
-              <a:t>03/02/2014</a:t>
+              <a:t>11/02/2014</a:t>
             </a:fld>
             <a:endParaRPr lang="en-GB"/>
           </a:p>
@@ -6069,7 +6522,7 @@
           <a:p>
             <a:fld id="{1F8D5B3F-2953-462A-863C-57A86A073E3F}" type="datetimeFigureOut">
               <a:rPr lang="en-GB" smtClean="0"/>
-              <a:t>03/02/2014</a:t>
+              <a:t>11/02/2014</a:t>
             </a:fld>
             <a:endParaRPr lang="en-GB"/>
           </a:p>
@@ -6610,7 +7063,7 @@
           <a:p>
             <a:fld id="{1F8D5B3F-2953-462A-863C-57A86A073E3F}" type="datetimeFigureOut">
               <a:rPr lang="en-GB" smtClean="0"/>
-              <a:t>03/02/2014</a:t>
+              <a:t>11/02/2014</a:t>
             </a:fld>
             <a:endParaRPr lang="en-GB"/>
           </a:p>
@@ -6723,7 +7176,7 @@
           <a:p>
             <a:fld id="{1F8D5B3F-2953-462A-863C-57A86A073E3F}" type="datetimeFigureOut">
               <a:rPr lang="en-GB" smtClean="0"/>
-              <a:t>03/02/2014</a:t>
+              <a:t>11/02/2014</a:t>
             </a:fld>
             <a:endParaRPr lang="en-GB"/>
           </a:p>
@@ -8434,7 +8887,7 @@
           <a:p>
             <a:fld id="{1F8D5B3F-2953-462A-863C-57A86A073E3F}" type="datetimeFigureOut">
               <a:rPr lang="en-GB" smtClean="0"/>
-              <a:t>03/02/2014</a:t>
+              <a:t>11/02/2014</a:t>
             </a:fld>
             <a:endParaRPr lang="en-GB"/>
           </a:p>
@@ -8585,7 +9038,7 @@
           <a:p>
             <a:fld id="{1F8D5B3F-2953-462A-863C-57A86A073E3F}" type="datetimeFigureOut">
               <a:rPr lang="en-GB" smtClean="0"/>
-              <a:t>03/02/2014</a:t>
+              <a:t>11/02/2014</a:t>
             </a:fld>
             <a:endParaRPr lang="en-GB"/>
           </a:p>
@@ -12200,7 +12653,7 @@
           <a:p>
             <a:fld id="{1F8D5B3F-2953-462A-863C-57A86A073E3F}" type="datetimeFigureOut">
               <a:rPr lang="en-GB" smtClean="0"/>
-              <a:t>03/02/2014</a:t>
+              <a:t>11/02/2014</a:t>
             </a:fld>
             <a:endParaRPr lang="en-GB"/>
           </a:p>
@@ -14059,7 +14512,7 @@
           <a:p>
             <a:fld id="{1F8D5B3F-2953-462A-863C-57A86A073E3F}" type="datetimeFigureOut">
               <a:rPr lang="en-GB" smtClean="0"/>
-              <a:t>03/02/2014</a:t>
+              <a:t>11/02/2014</a:t>
             </a:fld>
             <a:endParaRPr lang="en-GB"/>
           </a:p>
@@ -14904,13 +15357,13 @@
         </p:nvSpPr>
         <p:spPr>
           <a:xfrm>
-            <a:off x="539552" y="2924944"/>
-            <a:ext cx="8208912" cy="3816424"/>
+            <a:off x="539552" y="2348880"/>
+            <a:ext cx="8208912" cy="2520280"/>
           </a:xfrm>
         </p:spPr>
         <p:txBody>
           <a:bodyPr>
-            <a:normAutofit/>
+            <a:normAutofit fontScale="92500" lnSpcReduction="10000"/>
           </a:bodyPr>
           <a:lstStyle/>
           <a:p>
@@ -14946,8 +15399,9 @@
             </a:r>
             <a:r>
               <a:rPr lang="en-GB" dirty="0" smtClean="0"/>
-              <a:t>volumes;</a:t>
+              <a:t>volumes (operators: insertion, transformation, branching);</a:t>
             </a:r>
+            <a:endParaRPr lang="en-GB" dirty="0" smtClean="0"/>
           </a:p>
           <a:p>
             <a:pPr lvl="1"/>
@@ -14965,7 +15419,7 @@
             </a:r>
             <a:r>
               <a:rPr lang="en-GB" dirty="0" smtClean="0"/>
-              <a:t>shapes;</a:t>
+              <a:t>shapes (Houdini FX);</a:t>
             </a:r>
             <a:endParaRPr lang="en-GB" dirty="0"/>
           </a:p>
@@ -14994,6 +15448,72 @@
           </a:p>
         </p:txBody>
       </p:sp>
+      <p:pic>
+        <p:nvPicPr>
+          <p:cNvPr id="4" name="Рисунок 3" descr="C:\Users\GreyMatter\Pictures\hrtrhrth.PNG"/>
+          <p:cNvPicPr/>
+          <p:nvPr/>
+        </p:nvPicPr>
+        <p:blipFill>
+          <a:blip r:embed="rId2">
+            <a:extLst>
+              <a:ext uri="{28A0092B-C50C-407E-A947-70E740481C1C}">
+                <a14:useLocalDpi xmlns:a14="http://schemas.microsoft.com/office/drawing/2010/main" val="0"/>
+              </a:ext>
+            </a:extLst>
+          </a:blip>
+          <a:srcRect/>
+          <a:stretch>
+            <a:fillRect/>
+          </a:stretch>
+        </p:blipFill>
+        <p:spPr bwMode="auto">
+          <a:xfrm>
+            <a:off x="2627019" y="4811122"/>
+            <a:ext cx="1235710" cy="995045"/>
+          </a:xfrm>
+          <a:prstGeom prst="rect">
+            <a:avLst/>
+          </a:prstGeom>
+          <a:noFill/>
+          <a:ln>
+            <a:noFill/>
+          </a:ln>
+        </p:spPr>
+      </p:pic>
+      <p:pic>
+        <p:nvPicPr>
+          <p:cNvPr id="5" name="Рисунок 4" descr="C:\Users\GreyMatter\Pictures\hrtrthhr.PNG"/>
+          <p:cNvPicPr/>
+          <p:nvPr/>
+        </p:nvPicPr>
+        <p:blipFill>
+          <a:blip r:embed="rId3">
+            <a:extLst>
+              <a:ext uri="{28A0092B-C50C-407E-A947-70E740481C1C}">
+                <a14:useLocalDpi xmlns:a14="http://schemas.microsoft.com/office/drawing/2010/main" val="0"/>
+              </a:ext>
+            </a:extLst>
+          </a:blip>
+          <a:srcRect/>
+          <a:stretch>
+            <a:fillRect/>
+          </a:stretch>
+        </p:blipFill>
+        <p:spPr bwMode="auto">
+          <a:xfrm>
+            <a:off x="4013859" y="4797152"/>
+            <a:ext cx="2550160" cy="1010920"/>
+          </a:xfrm>
+          <a:prstGeom prst="rect">
+            <a:avLst/>
+          </a:prstGeom>
+          <a:noFill/>
+          <a:ln>
+            <a:noFill/>
+          </a:ln>
+        </p:spPr>
+      </p:pic>
     </p:spTree>
     <p:extLst>
       <p:ext uri="{BB962C8B-B14F-4D97-AF65-F5344CB8AC3E}">
@@ -15064,7 +15584,15 @@
           <a:p>
             <a:r>
               <a:rPr lang="en-US" dirty="0"/>
-              <a:t>Instead of generating a line segment like how it does in using 2D L-System to draw a tree, it generate a rectangle </a:t>
+              <a:t>Instead of generating a line segment like how it does in using 2D L-System to draw a tree, it </a:t>
+            </a:r>
+            <a:r>
+              <a:rPr lang="en-US" dirty="0" smtClean="0"/>
+              <a:t>generates </a:t>
+            </a:r>
+            <a:r>
+              <a:rPr lang="en-US" dirty="0"/>
+              <a:t>a rectangle </a:t>
             </a:r>
             <a:r>
               <a:rPr lang="en-US" dirty="0" smtClean="0"/>
@@ -18793,7 +19321,7 @@
             <p:nvPr/>
           </p:nvPicPr>
           <p:blipFill>
-            <a:blip r:embed="rId2" cstate="print">
+            <a:blip r:embed="rId3" cstate="print">
               <a:extLst>
                 <a:ext uri="{28A0092B-C50C-407E-A947-70E740481C1C}">
                   <a14:useLocalDpi xmlns:a14="http://schemas.microsoft.com/office/drawing/2010/main" val="0"/>
@@ -18828,7 +19356,7 @@
             <p:nvPr/>
           </p:nvPicPr>
           <p:blipFill>
-            <a:blip r:embed="rId3" cstate="print">
+            <a:blip r:embed="rId4" cstate="print">
               <a:extLst>
                 <a:ext uri="{28A0092B-C50C-407E-A947-70E740481C1C}">
                   <a14:useLocalDpi xmlns:a14="http://schemas.microsoft.com/office/drawing/2010/main" val="0"/>
@@ -18905,8 +19433,8 @@
         </p:nvGrpSpPr>
         <p:grpSpPr>
           <a:xfrm>
-            <a:off x="1757815" y="5231439"/>
-            <a:ext cx="5327931" cy="781051"/>
+            <a:off x="3262827" y="5337910"/>
+            <a:ext cx="4313946" cy="632405"/>
             <a:chOff x="2011997" y="3053715"/>
             <a:chExt cx="5120005" cy="750570"/>
           </a:xfrm>
@@ -19976,6 +20504,660 @@
           </a:p>
         </p:txBody>
       </p:sp>
+      <p:sp>
+        <p:nvSpPr>
+          <p:cNvPr id="2" name="Прямоугольник 1"/>
+          <p:cNvSpPr/>
+          <p:nvPr/>
+        </p:nvSpPr>
+        <p:spPr>
+          <a:xfrm>
+            <a:off x="1259632" y="5311026"/>
+            <a:ext cx="792088" cy="710262"/>
+          </a:xfrm>
+          <a:prstGeom prst="rect">
+            <a:avLst/>
+          </a:prstGeom>
+        </p:spPr>
+        <p:style>
+          <a:lnRef idx="2">
+            <a:schemeClr val="accent1">
+              <a:shade val="50000"/>
+            </a:schemeClr>
+          </a:lnRef>
+          <a:fillRef idx="1">
+            <a:schemeClr val="accent1"/>
+          </a:fillRef>
+          <a:effectRef idx="0">
+            <a:schemeClr val="accent1"/>
+          </a:effectRef>
+          <a:fontRef idx="minor">
+            <a:schemeClr val="lt1"/>
+          </a:fontRef>
+        </p:style>
+        <p:txBody>
+          <a:bodyPr rtlCol="0" anchor="ctr"/>
+          <a:lstStyle/>
+          <a:p>
+            <a:pPr algn="ctr"/>
+            <a:endParaRPr lang="en-GB"/>
+          </a:p>
+        </p:txBody>
+      </p:sp>
+      <p:sp>
+        <p:nvSpPr>
+          <p:cNvPr id="4" name="Параллелограмм 3"/>
+          <p:cNvSpPr/>
+          <p:nvPr/>
+        </p:nvSpPr>
+        <p:spPr>
+          <a:xfrm rot="16200000">
+            <a:off x="474090" y="5235745"/>
+            <a:ext cx="990005" cy="581080"/>
+          </a:xfrm>
+          <a:prstGeom prst="parallelogram">
+            <a:avLst>
+              <a:gd name="adj" fmla="val 45982"/>
+            </a:avLst>
+          </a:prstGeom>
+        </p:spPr>
+        <p:style>
+          <a:lnRef idx="2">
+            <a:schemeClr val="accent1">
+              <a:shade val="50000"/>
+            </a:schemeClr>
+          </a:lnRef>
+          <a:fillRef idx="1">
+            <a:schemeClr val="accent1"/>
+          </a:fillRef>
+          <a:effectRef idx="0">
+            <a:schemeClr val="accent1"/>
+          </a:effectRef>
+          <a:fontRef idx="minor">
+            <a:schemeClr val="lt1"/>
+          </a:fontRef>
+        </p:style>
+        <p:txBody>
+          <a:bodyPr rtlCol="0" anchor="ctr"/>
+          <a:lstStyle/>
+          <a:p>
+            <a:pPr algn="ctr"/>
+            <a:endParaRPr lang="en-GB"/>
+          </a:p>
+        </p:txBody>
+      </p:sp>
+      <p:cxnSp>
+        <p:nvCxnSpPr>
+          <p:cNvPr id="6" name="Прямая со стрелкой 5"/>
+          <p:cNvCxnSpPr/>
+          <p:nvPr/>
+        </p:nvCxnSpPr>
+        <p:spPr>
+          <a:xfrm flipV="1">
+            <a:off x="1259632" y="4938198"/>
+            <a:ext cx="0" cy="372828"/>
+          </a:xfrm>
+          <a:prstGeom prst="straightConnector1">
+            <a:avLst/>
+          </a:prstGeom>
+          <a:ln w="28575">
+            <a:solidFill>
+              <a:srgbClr val="FF0000"/>
+            </a:solidFill>
+            <a:tailEnd type="arrow"/>
+          </a:ln>
+        </p:spPr>
+        <p:style>
+          <a:lnRef idx="1">
+            <a:schemeClr val="accent1"/>
+          </a:lnRef>
+          <a:fillRef idx="0">
+            <a:schemeClr val="accent1"/>
+          </a:fillRef>
+          <a:effectRef idx="0">
+            <a:schemeClr val="accent1"/>
+          </a:effectRef>
+          <a:fontRef idx="minor">
+            <a:schemeClr val="tx1"/>
+          </a:fontRef>
+        </p:style>
+      </p:cxnSp>
+      <p:sp>
+        <p:nvSpPr>
+          <p:cNvPr id="41" name="Параллелограмм 40"/>
+          <p:cNvSpPr/>
+          <p:nvPr/>
+        </p:nvSpPr>
+        <p:spPr>
+          <a:xfrm rot="16200000" flipV="1">
+            <a:off x="1844202" y="5245543"/>
+            <a:ext cx="990005" cy="574968"/>
+          </a:xfrm>
+          <a:prstGeom prst="parallelogram">
+            <a:avLst>
+              <a:gd name="adj" fmla="val 45982"/>
+            </a:avLst>
+          </a:prstGeom>
+        </p:spPr>
+        <p:style>
+          <a:lnRef idx="2">
+            <a:schemeClr val="accent1">
+              <a:shade val="50000"/>
+            </a:schemeClr>
+          </a:lnRef>
+          <a:fillRef idx="1">
+            <a:schemeClr val="accent1"/>
+          </a:fillRef>
+          <a:effectRef idx="0">
+            <a:schemeClr val="accent1"/>
+          </a:effectRef>
+          <a:fontRef idx="minor">
+            <a:schemeClr val="lt1"/>
+          </a:fontRef>
+        </p:style>
+        <p:txBody>
+          <a:bodyPr rtlCol="0" anchor="ctr"/>
+          <a:lstStyle/>
+          <a:p>
+            <a:pPr algn="ctr"/>
+            <a:endParaRPr lang="en-GB"/>
+          </a:p>
+        </p:txBody>
+      </p:sp>
+      <p:cxnSp>
+        <p:nvCxnSpPr>
+          <p:cNvPr id="10" name="Прямая со стрелкой 9"/>
+          <p:cNvCxnSpPr/>
+          <p:nvPr/>
+        </p:nvCxnSpPr>
+        <p:spPr>
+          <a:xfrm>
+            <a:off x="2626689" y="5781914"/>
+            <a:ext cx="432048" cy="360040"/>
+          </a:xfrm>
+          <a:prstGeom prst="straightConnector1">
+            <a:avLst/>
+          </a:prstGeom>
+          <a:ln w="28575">
+            <a:solidFill>
+              <a:srgbClr val="00B050"/>
+            </a:solidFill>
+            <a:tailEnd type="arrow"/>
+          </a:ln>
+        </p:spPr>
+        <p:style>
+          <a:lnRef idx="1">
+            <a:schemeClr val="accent1"/>
+          </a:lnRef>
+          <a:fillRef idx="0">
+            <a:schemeClr val="accent1"/>
+          </a:fillRef>
+          <a:effectRef idx="0">
+            <a:schemeClr val="accent1"/>
+          </a:effectRef>
+          <a:fontRef idx="minor">
+            <a:schemeClr val="tx1"/>
+          </a:fontRef>
+        </p:style>
+      </p:cxnSp>
+      <p:cxnSp>
+        <p:nvCxnSpPr>
+          <p:cNvPr id="12" name="Прямая со стрелкой 11"/>
+          <p:cNvCxnSpPr/>
+          <p:nvPr/>
+        </p:nvCxnSpPr>
+        <p:spPr>
+          <a:xfrm flipV="1">
+            <a:off x="2051720" y="4938198"/>
+            <a:ext cx="0" cy="1083090"/>
+          </a:xfrm>
+          <a:prstGeom prst="straightConnector1">
+            <a:avLst/>
+          </a:prstGeom>
+          <a:ln w="28575">
+            <a:solidFill>
+              <a:srgbClr val="7030A0"/>
+            </a:solidFill>
+            <a:tailEnd type="arrow"/>
+          </a:ln>
+        </p:spPr>
+        <p:style>
+          <a:lnRef idx="1">
+            <a:schemeClr val="accent1"/>
+          </a:lnRef>
+          <a:fillRef idx="0">
+            <a:schemeClr val="accent1"/>
+          </a:fillRef>
+          <a:effectRef idx="0">
+            <a:schemeClr val="accent1"/>
+          </a:effectRef>
+          <a:fontRef idx="minor">
+            <a:schemeClr val="tx1"/>
+          </a:fontRef>
+        </p:style>
+      </p:cxnSp>
+      <p:sp>
+        <p:nvSpPr>
+          <p:cNvPr id="13" name="TextBox 12"/>
+          <p:cNvSpPr txBox="1"/>
+          <p:nvPr/>
+        </p:nvSpPr>
+        <p:spPr>
+          <a:xfrm>
+            <a:off x="1425254" y="5455300"/>
+            <a:ext cx="482450" cy="369332"/>
+          </a:xfrm>
+          <a:prstGeom prst="rect">
+            <a:avLst/>
+          </a:prstGeom>
+          <a:noFill/>
+        </p:spPr>
+        <p:txBody>
+          <a:bodyPr wrap="square" rtlCol="0">
+            <a:spAutoFit/>
+          </a:bodyPr>
+          <a:lstStyle/>
+          <a:p>
+            <a:r>
+              <a:rPr lang="en-GB" sz="900" dirty="0" smtClean="0"/>
+              <a:t>First wall</a:t>
+            </a:r>
+            <a:endParaRPr lang="en-GB" sz="900" dirty="0"/>
+          </a:p>
+        </p:txBody>
+      </p:sp>
+      <p:sp>
+        <p:nvSpPr>
+          <p:cNvPr id="47" name="TextBox 46"/>
+          <p:cNvSpPr txBox="1"/>
+          <p:nvPr/>
+        </p:nvSpPr>
+        <p:spPr>
+          <a:xfrm>
+            <a:off x="727867" y="5326620"/>
+            <a:ext cx="482450" cy="369332"/>
+          </a:xfrm>
+          <a:prstGeom prst="rect">
+            <a:avLst/>
+          </a:prstGeom>
+          <a:noFill/>
+        </p:spPr>
+        <p:txBody>
+          <a:bodyPr wrap="square" rtlCol="0">
+            <a:spAutoFit/>
+          </a:bodyPr>
+          <a:lstStyle/>
+          <a:p>
+            <a:r>
+              <a:rPr lang="en-GB" sz="900" dirty="0" smtClean="0"/>
+              <a:t>Last wall</a:t>
+            </a:r>
+            <a:endParaRPr lang="en-GB" sz="900" dirty="0"/>
+          </a:p>
+        </p:txBody>
+      </p:sp>
+      <p:sp>
+        <p:nvSpPr>
+          <p:cNvPr id="48" name="TextBox 47"/>
+          <p:cNvSpPr txBox="1"/>
+          <p:nvPr/>
+        </p:nvSpPr>
+        <p:spPr>
+          <a:xfrm>
+            <a:off x="2068964" y="5401956"/>
+            <a:ext cx="557725" cy="369332"/>
+          </a:xfrm>
+          <a:prstGeom prst="rect">
+            <a:avLst/>
+          </a:prstGeom>
+          <a:noFill/>
+        </p:spPr>
+        <p:txBody>
+          <a:bodyPr wrap="square" rtlCol="0">
+            <a:spAutoFit/>
+          </a:bodyPr>
+          <a:lstStyle/>
+          <a:p>
+            <a:r>
+              <a:rPr lang="en-GB" sz="900" dirty="0" smtClean="0"/>
+              <a:t>Current wall</a:t>
+            </a:r>
+            <a:endParaRPr lang="en-GB" sz="900" dirty="0"/>
+          </a:p>
+        </p:txBody>
+      </p:sp>
+      <p:cxnSp>
+        <p:nvCxnSpPr>
+          <p:cNvPr id="15" name="Прямая со стрелкой 14"/>
+          <p:cNvCxnSpPr/>
+          <p:nvPr/>
+        </p:nvCxnSpPr>
+        <p:spPr>
+          <a:xfrm flipH="1" flipV="1">
+            <a:off x="678552" y="5031282"/>
+            <a:ext cx="581080" cy="279744"/>
+          </a:xfrm>
+          <a:prstGeom prst="straightConnector1">
+            <a:avLst/>
+          </a:prstGeom>
+          <a:ln w="12700">
+            <a:solidFill>
+              <a:srgbClr val="FF0000"/>
+            </a:solidFill>
+            <a:tailEnd type="arrow"/>
+          </a:ln>
+        </p:spPr>
+        <p:style>
+          <a:lnRef idx="1">
+            <a:schemeClr val="accent1"/>
+          </a:lnRef>
+          <a:fillRef idx="0">
+            <a:schemeClr val="accent1"/>
+          </a:fillRef>
+          <a:effectRef idx="0">
+            <a:schemeClr val="accent1"/>
+          </a:effectRef>
+          <a:fontRef idx="minor">
+            <a:schemeClr val="tx1"/>
+          </a:fontRef>
+        </p:style>
+      </p:cxnSp>
+      <p:cxnSp>
+        <p:nvCxnSpPr>
+          <p:cNvPr id="51" name="Прямая со стрелкой 50"/>
+          <p:cNvCxnSpPr/>
+          <p:nvPr/>
+        </p:nvCxnSpPr>
+        <p:spPr>
+          <a:xfrm>
+            <a:off x="1259633" y="5311026"/>
+            <a:ext cx="648071" cy="0"/>
+          </a:xfrm>
+          <a:prstGeom prst="straightConnector1">
+            <a:avLst/>
+          </a:prstGeom>
+          <a:ln w="12700">
+            <a:solidFill>
+              <a:srgbClr val="FF0000"/>
+            </a:solidFill>
+            <a:tailEnd type="arrow"/>
+          </a:ln>
+        </p:spPr>
+        <p:style>
+          <a:lnRef idx="1">
+            <a:schemeClr val="accent1"/>
+          </a:lnRef>
+          <a:fillRef idx="0">
+            <a:schemeClr val="accent1"/>
+          </a:fillRef>
+          <a:effectRef idx="0">
+            <a:schemeClr val="accent1"/>
+          </a:effectRef>
+          <a:fontRef idx="minor">
+            <a:schemeClr val="tx1"/>
+          </a:fontRef>
+        </p:style>
+      </p:cxnSp>
+      <p:cxnSp>
+        <p:nvCxnSpPr>
+          <p:cNvPr id="18" name="Прямая со стрелкой 17"/>
+          <p:cNvCxnSpPr/>
+          <p:nvPr/>
+        </p:nvCxnSpPr>
+        <p:spPr>
+          <a:xfrm flipV="1">
+            <a:off x="2626689" y="5124612"/>
+            <a:ext cx="0" cy="635972"/>
+          </a:xfrm>
+          <a:prstGeom prst="straightConnector1">
+            <a:avLst/>
+          </a:prstGeom>
+          <a:ln w="12700">
+            <a:solidFill>
+              <a:srgbClr val="00B050"/>
+            </a:solidFill>
+            <a:tailEnd type="arrow"/>
+          </a:ln>
+        </p:spPr>
+        <p:style>
+          <a:lnRef idx="1">
+            <a:schemeClr val="accent1"/>
+          </a:lnRef>
+          <a:fillRef idx="0">
+            <a:schemeClr val="accent1"/>
+          </a:fillRef>
+          <a:effectRef idx="0">
+            <a:schemeClr val="accent1"/>
+          </a:effectRef>
+          <a:fontRef idx="minor">
+            <a:schemeClr val="tx1"/>
+          </a:fontRef>
+        </p:style>
+      </p:cxnSp>
+      <p:cxnSp>
+        <p:nvCxnSpPr>
+          <p:cNvPr id="55" name="Прямая со стрелкой 54"/>
+          <p:cNvCxnSpPr/>
+          <p:nvPr/>
+        </p:nvCxnSpPr>
+        <p:spPr>
+          <a:xfrm flipH="1">
+            <a:off x="2068964" y="5764863"/>
+            <a:ext cx="557725" cy="243171"/>
+          </a:xfrm>
+          <a:prstGeom prst="straightConnector1">
+            <a:avLst/>
+          </a:prstGeom>
+          <a:ln w="12700">
+            <a:solidFill>
+              <a:srgbClr val="00B050"/>
+            </a:solidFill>
+            <a:tailEnd type="arrow"/>
+          </a:ln>
+        </p:spPr>
+        <p:style>
+          <a:lnRef idx="1">
+            <a:schemeClr val="accent1"/>
+          </a:lnRef>
+          <a:fillRef idx="0">
+            <a:schemeClr val="accent1"/>
+          </a:fillRef>
+          <a:effectRef idx="0">
+            <a:schemeClr val="accent1"/>
+          </a:effectRef>
+          <a:fontRef idx="minor">
+            <a:schemeClr val="tx1"/>
+          </a:fontRef>
+        </p:style>
+      </p:cxnSp>
+      <p:cxnSp>
+        <p:nvCxnSpPr>
+          <p:cNvPr id="23" name="Прямая со стрелкой 22"/>
+          <p:cNvCxnSpPr/>
+          <p:nvPr/>
+        </p:nvCxnSpPr>
+        <p:spPr>
+          <a:xfrm>
+            <a:off x="2068964" y="6028030"/>
+            <a:ext cx="198780" cy="173278"/>
+          </a:xfrm>
+          <a:prstGeom prst="straightConnector1">
+            <a:avLst/>
+          </a:prstGeom>
+          <a:ln w="12700">
+            <a:solidFill>
+              <a:srgbClr val="7030A0"/>
+            </a:solidFill>
+            <a:tailEnd type="arrow"/>
+          </a:ln>
+        </p:spPr>
+        <p:style>
+          <a:lnRef idx="1">
+            <a:schemeClr val="accent1"/>
+          </a:lnRef>
+          <a:fillRef idx="0">
+            <a:schemeClr val="accent1"/>
+          </a:fillRef>
+          <a:effectRef idx="0">
+            <a:schemeClr val="accent1"/>
+          </a:effectRef>
+          <a:fontRef idx="minor">
+            <a:schemeClr val="tx1"/>
+          </a:fontRef>
+        </p:style>
+      </p:cxnSp>
+      <p:cxnSp>
+        <p:nvCxnSpPr>
+          <p:cNvPr id="82" name="Прямая со стрелкой 81"/>
+          <p:cNvCxnSpPr>
+            <a:endCxn id="41" idx="5"/>
+          </p:cNvCxnSpPr>
+          <p:nvPr/>
+        </p:nvCxnSpPr>
+        <p:spPr>
+          <a:xfrm flipV="1">
+            <a:off x="2042677" y="5895839"/>
+            <a:ext cx="296528" cy="132191"/>
+          </a:xfrm>
+          <a:prstGeom prst="straightConnector1">
+            <a:avLst/>
+          </a:prstGeom>
+          <a:ln w="12700">
+            <a:solidFill>
+              <a:srgbClr val="7030A0"/>
+            </a:solidFill>
+            <a:tailEnd type="arrow"/>
+          </a:ln>
+        </p:spPr>
+        <p:style>
+          <a:lnRef idx="1">
+            <a:schemeClr val="accent1"/>
+          </a:lnRef>
+          <a:fillRef idx="0">
+            <a:schemeClr val="accent1"/>
+          </a:fillRef>
+          <a:effectRef idx="0">
+            <a:schemeClr val="accent1"/>
+          </a:effectRef>
+          <a:fontRef idx="minor">
+            <a:schemeClr val="tx1"/>
+          </a:fontRef>
+        </p:style>
+      </p:cxnSp>
+      <p:sp>
+        <p:nvSpPr>
+          <p:cNvPr id="29" name="TextBox 28"/>
+          <p:cNvSpPr txBox="1"/>
+          <p:nvPr/>
+        </p:nvSpPr>
+        <p:spPr>
+          <a:xfrm>
+            <a:off x="1251266" y="4957288"/>
+            <a:ext cx="218416" cy="276999"/>
+          </a:xfrm>
+          <a:prstGeom prst="rect">
+            <a:avLst/>
+          </a:prstGeom>
+          <a:noFill/>
+        </p:spPr>
+        <p:txBody>
+          <a:bodyPr wrap="square" rtlCol="0">
+            <a:spAutoFit/>
+          </a:bodyPr>
+          <a:lstStyle/>
+          <a:p>
+            <a:r>
+              <a:rPr lang="en-GB" sz="1200" b="1" dirty="0" smtClean="0">
+                <a:solidFill>
+                  <a:srgbClr val="FF0000"/>
+                </a:solidFill>
+              </a:rPr>
+              <a:t>1</a:t>
+            </a:r>
+            <a:endParaRPr lang="en-GB" sz="1200" b="1" dirty="0">
+              <a:solidFill>
+                <a:srgbClr val="FF0000"/>
+              </a:solidFill>
+            </a:endParaRPr>
+          </a:p>
+        </p:txBody>
+      </p:sp>
+      <p:sp>
+        <p:nvSpPr>
+          <p:cNvPr id="83" name="TextBox 82"/>
+          <p:cNvSpPr txBox="1"/>
+          <p:nvPr/>
+        </p:nvSpPr>
+        <p:spPr>
+          <a:xfrm>
+            <a:off x="2655877" y="5499913"/>
+            <a:ext cx="218416" cy="276999"/>
+          </a:xfrm>
+          <a:prstGeom prst="rect">
+            <a:avLst/>
+          </a:prstGeom>
+          <a:noFill/>
+        </p:spPr>
+        <p:txBody>
+          <a:bodyPr wrap="square" rtlCol="0">
+            <a:spAutoFit/>
+          </a:bodyPr>
+          <a:lstStyle/>
+          <a:p>
+            <a:r>
+              <a:rPr lang="en-GB" sz="1200" b="1" dirty="0" smtClean="0">
+                <a:solidFill>
+                  <a:srgbClr val="00B050"/>
+                </a:solidFill>
+              </a:rPr>
+              <a:t>2</a:t>
+            </a:r>
+            <a:endParaRPr lang="en-GB" sz="1200" b="1" dirty="0">
+              <a:solidFill>
+                <a:srgbClr val="00B050"/>
+              </a:solidFill>
+            </a:endParaRPr>
+          </a:p>
+        </p:txBody>
+      </p:sp>
+      <p:sp>
+        <p:nvSpPr>
+          <p:cNvPr id="84" name="TextBox 83"/>
+          <p:cNvSpPr txBox="1"/>
+          <p:nvPr/>
+        </p:nvSpPr>
+        <p:spPr>
+          <a:xfrm>
+            <a:off x="2042677" y="4957287"/>
+            <a:ext cx="218416" cy="276999"/>
+          </a:xfrm>
+          <a:prstGeom prst="rect">
+            <a:avLst/>
+          </a:prstGeom>
+          <a:noFill/>
+        </p:spPr>
+        <p:txBody>
+          <a:bodyPr wrap="square" rtlCol="0">
+            <a:spAutoFit/>
+          </a:bodyPr>
+          <a:lstStyle/>
+          <a:p>
+            <a:r>
+              <a:rPr lang="en-GB" sz="1200" b="1" dirty="0" smtClean="0">
+                <a:solidFill>
+                  <a:srgbClr val="7030A0"/>
+                </a:solidFill>
+              </a:rPr>
+              <a:t>3</a:t>
+            </a:r>
+            <a:endParaRPr lang="en-GB" sz="1200" b="1" dirty="0">
+              <a:solidFill>
+                <a:srgbClr val="7030A0"/>
+              </a:solidFill>
+            </a:endParaRPr>
+          </a:p>
+        </p:txBody>
+      </p:sp>
     </p:spTree>
     <p:extLst>
       <p:ext uri="{BB962C8B-B14F-4D97-AF65-F5344CB8AC3E}">
@@ -20019,7 +21201,7 @@
         <p:spPr/>
         <p:txBody>
           <a:bodyPr>
-            <a:normAutofit fontScale="92500"/>
+            <a:normAutofit lnSpcReduction="10000"/>
           </a:bodyPr>
           <a:lstStyle/>
           <a:p>
@@ -20032,7 +21214,27 @@
             <a:pPr lvl="1"/>
             <a:r>
               <a:rPr lang="en-GB" dirty="0" smtClean="0"/>
-              <a:t>The next step would be adding more details to the building;</a:t>
+              <a:t>The next step would be adding more details to the </a:t>
+            </a:r>
+            <a:r>
+              <a:rPr lang="en-GB" dirty="0"/>
+              <a:t>building: </a:t>
+            </a:r>
+            <a:r>
+              <a:rPr lang="en-GB" dirty="0" smtClean="0"/>
+              <a:t>various </a:t>
+            </a:r>
+            <a:r>
+              <a:rPr lang="en-GB" dirty="0"/>
+              <a:t>roofs, </a:t>
+            </a:r>
+            <a:r>
+              <a:rPr lang="en-GB" dirty="0" smtClean="0"/>
+              <a:t>different window </a:t>
+            </a:r>
+            <a:r>
+              <a:rPr lang="en-GB" dirty="0"/>
+              <a:t>and balcony shapes, stairs and etc.</a:t>
             </a:r>
           </a:p>
           <a:p>
@@ -20040,13 +21242,6 @@
             <a:r>
               <a:rPr lang="en-GB" dirty="0" smtClean="0"/>
               <a:t>Making each floor of the building different from each other;</a:t>
-            </a:r>
-          </a:p>
-          <a:p>
-            <a:pPr lvl="1"/>
-            <a:r>
-              <a:rPr lang="en-GB" dirty="0" smtClean="0"/>
-              <a:t>Adding various roofs, window and balcony shapes, stairs and etc.</a:t>
             </a:r>
           </a:p>
           <a:p>
@@ -20405,4 +21600,289 @@
   <a:objectDefaults/>
   <a:extraClrSchemeLst/>
 </a:theme>
+</file>
+
+<file path=ppt/theme/theme2.xml><?xml version="1.0" encoding="utf-8"?>
+<a:theme xmlns:a="http://schemas.openxmlformats.org/drawingml/2006/main" name="Тема Office">
+  <a:themeElements>
+    <a:clrScheme name="Стандартная">
+      <a:dk1>
+        <a:sysClr val="windowText" lastClr="000000"/>
+      </a:dk1>
+      <a:lt1>
+        <a:sysClr val="window" lastClr="FFFFFF"/>
+      </a:lt1>
+      <a:dk2>
+        <a:srgbClr val="1F497D"/>
+      </a:dk2>
+      <a:lt2>
+        <a:srgbClr val="EEECE1"/>
+      </a:lt2>
+      <a:accent1>
+        <a:srgbClr val="4F81BD"/>
+      </a:accent1>
+      <a:accent2>
+        <a:srgbClr val="C0504D"/>
+      </a:accent2>
+      <a:accent3>
+        <a:srgbClr val="9BBB59"/>
+      </a:accent3>
+      <a:accent4>
+        <a:srgbClr val="8064A2"/>
+      </a:accent4>
+      <a:accent5>
+        <a:srgbClr val="4BACC6"/>
+      </a:accent5>
+      <a:accent6>
+        <a:srgbClr val="F79646"/>
+      </a:accent6>
+      <a:hlink>
+        <a:srgbClr val="0000FF"/>
+      </a:hlink>
+      <a:folHlink>
+        <a:srgbClr val="800080"/>
+      </a:folHlink>
+    </a:clrScheme>
+    <a:fontScheme name="Стандартная">
+      <a:majorFont>
+        <a:latin typeface="Calibri"/>
+        <a:ea typeface=""/>
+        <a:cs typeface=""/>
+        <a:font script="Jpan" typeface="ＭＳ Ｐゴシック"/>
+        <a:font script="Hang" typeface="맑은 고딕"/>
+        <a:font script="Hans" typeface="宋体"/>
+        <a:font script="Hant" typeface="新細明體"/>
+        <a:font script="Arab" typeface="Times New Roman"/>
+        <a:font script="Hebr" typeface="Times New Roman"/>
+        <a:font script="Thai" typeface="Angsana New"/>
+        <a:font script="Ethi" typeface="Nyala"/>
+        <a:font script="Beng" typeface="Vrinda"/>
+        <a:font script="Gujr" typeface="Shruti"/>
+        <a:font script="Khmr" typeface="MoolBoran"/>
+        <a:font script="Knda" typeface="Tunga"/>
+        <a:font script="Guru" typeface="Raavi"/>
+        <a:font script="Cans" typeface="Euphemia"/>
+        <a:font script="Cher" typeface="Plantagenet Cherokee"/>
+        <a:font script="Yiii" typeface="Microsoft Yi Baiti"/>
+        <a:font script="Tibt" typeface="Microsoft Himalaya"/>
+        <a:font script="Thaa" typeface="MV Boli"/>
+        <a:font script="Deva" typeface="Mangal"/>
+        <a:font script="Telu" typeface="Gautami"/>
+        <a:font script="Taml" typeface="Latha"/>
+        <a:font script="Syrc" typeface="Estrangelo Edessa"/>
+        <a:font script="Orya" typeface="Kalinga"/>
+        <a:font script="Mlym" typeface="Kartika"/>
+        <a:font script="Laoo" typeface="DokChampa"/>
+        <a:font script="Sinh" typeface="Iskoola Pota"/>
+        <a:font script="Mong" typeface="Mongolian Baiti"/>
+        <a:font script="Viet" typeface="Times New Roman"/>
+        <a:font script="Uigh" typeface="Microsoft Uighur"/>
+        <a:font script="Geor" typeface="Sylfaen"/>
+      </a:majorFont>
+      <a:minorFont>
+        <a:latin typeface="Calibri"/>
+        <a:ea typeface=""/>
+        <a:cs typeface=""/>
+        <a:font script="Jpan" typeface="ＭＳ Ｐゴシック"/>
+        <a:font script="Hang" typeface="맑은 고딕"/>
+        <a:font script="Hans" typeface="宋体"/>
+        <a:font script="Hant" typeface="新細明體"/>
+        <a:font script="Arab" typeface="Arial"/>
+        <a:font script="Hebr" typeface="Arial"/>
+        <a:font script="Thai" typeface="Cordia New"/>
+        <a:font script="Ethi" typeface="Nyala"/>
+        <a:font script="Beng" typeface="Vrinda"/>
+        <a:font script="Gujr" typeface="Shruti"/>
+        <a:font script="Khmr" typeface="DaunPenh"/>
+        <a:font script="Knda" typeface="Tunga"/>
+        <a:font script="Guru" typeface="Raavi"/>
+        <a:font script="Cans" typeface="Euphemia"/>
+        <a:font script="Cher" typeface="Plantagenet Cherokee"/>
+        <a:font script="Yiii" typeface="Microsoft Yi Baiti"/>
+        <a:font script="Tibt" typeface="Microsoft Himalaya"/>
+        <a:font script="Thaa" typeface="MV Boli"/>
+        <a:font script="Deva" typeface="Mangal"/>
+        <a:font script="Telu" typeface="Gautami"/>
+        <a:font script="Taml" typeface="Latha"/>
+        <a:font script="Syrc" typeface="Estrangelo Edessa"/>
+        <a:font script="Orya" typeface="Kalinga"/>
+        <a:font script="Mlym" typeface="Kartika"/>
+        <a:font script="Laoo" typeface="DokChampa"/>
+        <a:font script="Sinh" typeface="Iskoola Pota"/>
+        <a:font script="Mong" typeface="Mongolian Baiti"/>
+        <a:font script="Viet" typeface="Arial"/>
+        <a:font script="Uigh" typeface="Microsoft Uighur"/>
+        <a:font script="Geor" typeface="Sylfaen"/>
+      </a:minorFont>
+    </a:fontScheme>
+    <a:fmtScheme name="Стандартная">
+      <a:fillStyleLst>
+        <a:solidFill>
+          <a:schemeClr val="phClr"/>
+        </a:solidFill>
+        <a:gradFill rotWithShape="1">
+          <a:gsLst>
+            <a:gs pos="0">
+              <a:schemeClr val="phClr">
+                <a:tint val="50000"/>
+                <a:satMod val="300000"/>
+              </a:schemeClr>
+            </a:gs>
+            <a:gs pos="35000">
+              <a:schemeClr val="phClr">
+                <a:tint val="37000"/>
+                <a:satMod val="300000"/>
+              </a:schemeClr>
+            </a:gs>
+            <a:gs pos="100000">
+              <a:schemeClr val="phClr">
+                <a:tint val="15000"/>
+                <a:satMod val="350000"/>
+              </a:schemeClr>
+            </a:gs>
+          </a:gsLst>
+          <a:lin ang="16200000" scaled="1"/>
+        </a:gradFill>
+        <a:gradFill rotWithShape="1">
+          <a:gsLst>
+            <a:gs pos="0">
+              <a:schemeClr val="phClr">
+                <a:shade val="51000"/>
+                <a:satMod val="130000"/>
+              </a:schemeClr>
+            </a:gs>
+            <a:gs pos="80000">
+              <a:schemeClr val="phClr">
+                <a:shade val="93000"/>
+                <a:satMod val="130000"/>
+              </a:schemeClr>
+            </a:gs>
+            <a:gs pos="100000">
+              <a:schemeClr val="phClr">
+                <a:shade val="94000"/>
+                <a:satMod val="135000"/>
+              </a:schemeClr>
+            </a:gs>
+          </a:gsLst>
+          <a:lin ang="16200000" scaled="0"/>
+        </a:gradFill>
+      </a:fillStyleLst>
+      <a:lnStyleLst>
+        <a:ln w="9525" cap="flat" cmpd="sng" algn="ctr">
+          <a:solidFill>
+            <a:schemeClr val="phClr">
+              <a:shade val="95000"/>
+              <a:satMod val="105000"/>
+            </a:schemeClr>
+          </a:solidFill>
+          <a:prstDash val="solid"/>
+        </a:ln>
+        <a:ln w="25400" cap="flat" cmpd="sng" algn="ctr">
+          <a:solidFill>
+            <a:schemeClr val="phClr"/>
+          </a:solidFill>
+          <a:prstDash val="solid"/>
+        </a:ln>
+        <a:ln w="38100" cap="flat" cmpd="sng" algn="ctr">
+          <a:solidFill>
+            <a:schemeClr val="phClr"/>
+          </a:solidFill>
+          <a:prstDash val="solid"/>
+        </a:ln>
+      </a:lnStyleLst>
+      <a:effectStyleLst>
+        <a:effectStyle>
+          <a:effectLst>
+            <a:outerShdw blurRad="40000" dist="20000" dir="5400000" rotWithShape="0">
+              <a:srgbClr val="000000">
+                <a:alpha val="38000"/>
+              </a:srgbClr>
+            </a:outerShdw>
+          </a:effectLst>
+        </a:effectStyle>
+        <a:effectStyle>
+          <a:effectLst>
+            <a:outerShdw blurRad="40000" dist="23000" dir="5400000" rotWithShape="0">
+              <a:srgbClr val="000000">
+                <a:alpha val="35000"/>
+              </a:srgbClr>
+            </a:outerShdw>
+          </a:effectLst>
+        </a:effectStyle>
+        <a:effectStyle>
+          <a:effectLst>
+            <a:outerShdw blurRad="40000" dist="23000" dir="5400000" rotWithShape="0">
+              <a:srgbClr val="000000">
+                <a:alpha val="35000"/>
+              </a:srgbClr>
+            </a:outerShdw>
+          </a:effectLst>
+          <a:scene3d>
+            <a:camera prst="orthographicFront">
+              <a:rot lat="0" lon="0" rev="0"/>
+            </a:camera>
+            <a:lightRig rig="threePt" dir="t">
+              <a:rot lat="0" lon="0" rev="1200000"/>
+            </a:lightRig>
+          </a:scene3d>
+          <a:sp3d>
+            <a:bevelT w="63500" h="25400"/>
+          </a:sp3d>
+        </a:effectStyle>
+      </a:effectStyleLst>
+      <a:bgFillStyleLst>
+        <a:solidFill>
+          <a:schemeClr val="phClr"/>
+        </a:solidFill>
+        <a:gradFill rotWithShape="1">
+          <a:gsLst>
+            <a:gs pos="0">
+              <a:schemeClr val="phClr">
+                <a:tint val="40000"/>
+                <a:satMod val="350000"/>
+              </a:schemeClr>
+            </a:gs>
+            <a:gs pos="40000">
+              <a:schemeClr val="phClr">
+                <a:tint val="45000"/>
+                <a:shade val="99000"/>
+                <a:satMod val="350000"/>
+              </a:schemeClr>
+            </a:gs>
+            <a:gs pos="100000">
+              <a:schemeClr val="phClr">
+                <a:shade val="20000"/>
+                <a:satMod val="255000"/>
+              </a:schemeClr>
+            </a:gs>
+          </a:gsLst>
+          <a:path path="circle">
+            <a:fillToRect l="50000" t="-80000" r="50000" b="180000"/>
+          </a:path>
+        </a:gradFill>
+        <a:gradFill rotWithShape="1">
+          <a:gsLst>
+            <a:gs pos="0">
+              <a:schemeClr val="phClr">
+                <a:tint val="80000"/>
+                <a:satMod val="300000"/>
+              </a:schemeClr>
+            </a:gs>
+            <a:gs pos="100000">
+              <a:schemeClr val="phClr">
+                <a:shade val="30000"/>
+                <a:satMod val="200000"/>
+              </a:schemeClr>
+            </a:gs>
+          </a:gsLst>
+          <a:path path="circle">
+            <a:fillToRect l="50000" t="50000" r="50000" b="50000"/>
+          </a:path>
+        </a:gradFill>
+      </a:bgFillStyleLst>
+    </a:fmtScheme>
+  </a:themeElements>
+  <a:objectDefaults/>
+  <a:extraClrSchemeLst/>
+</a:theme>
 </file>
</xml_diff>